<commit_message>
@Required annotation on setter method
</commit_message>
<xml_diff>
--- a/SpringCore.pptx
+++ b/SpringCore.pptx
@@ -8,7 +8,8 @@
     <p:sldId id="256" r:id="rId2"/>
     <p:sldId id="257" r:id="rId3"/>
     <p:sldId id="270" r:id="rId4"/>
-    <p:sldId id="269" r:id="rId5"/>
+    <p:sldId id="271" r:id="rId5"/>
+    <p:sldId id="269" r:id="rId6"/>
   </p:sldIdLst>
   <p:sldSz cx="9144000" cy="6858000" type="screen4x3"/>
   <p:notesSz cx="6858000" cy="9144000"/>
@@ -298,7 +299,7 @@
           <a:p>
             <a:fld id="{8F235549-BF0A-4B98-8561-3786244E808C}" type="datetimeFigureOut">
               <a:rPr lang="en-US" smtClean="0"/>
-              <a:t>6/15/2017</a:t>
+              <a:t>3/22/2018</a:t>
             </a:fld>
             <a:endParaRPr lang="en-US"/>
           </a:p>
@@ -498,7 +499,7 @@
           <a:p>
             <a:fld id="{8F235549-BF0A-4B98-8561-3786244E808C}" type="datetimeFigureOut">
               <a:rPr lang="en-US" smtClean="0"/>
-              <a:t>6/15/2017</a:t>
+              <a:t>3/22/2018</a:t>
             </a:fld>
             <a:endParaRPr lang="en-US"/>
           </a:p>
@@ -673,7 +674,7 @@
           <a:p>
             <a:fld id="{8F235549-BF0A-4B98-8561-3786244E808C}" type="datetimeFigureOut">
               <a:rPr lang="en-US" smtClean="0"/>
-              <a:t>6/15/2017</a:t>
+              <a:t>3/22/2018</a:t>
             </a:fld>
             <a:endParaRPr lang="en-US"/>
           </a:p>
@@ -838,7 +839,7 @@
           <a:p>
             <a:fld id="{8F235549-BF0A-4B98-8561-3786244E808C}" type="datetimeFigureOut">
               <a:rPr lang="en-US" smtClean="0"/>
-              <a:t>6/15/2017</a:t>
+              <a:t>3/22/2018</a:t>
             </a:fld>
             <a:endParaRPr lang="en-US"/>
           </a:p>
@@ -1086,7 +1087,7 @@
           <a:p>
             <a:fld id="{8F235549-BF0A-4B98-8561-3786244E808C}" type="datetimeFigureOut">
               <a:rPr lang="en-US" smtClean="0"/>
-              <a:t>6/15/2017</a:t>
+              <a:t>3/22/2018</a:t>
             </a:fld>
             <a:endParaRPr lang="en-US"/>
           </a:p>
@@ -1404,7 +1405,7 @@
           <a:p>
             <a:fld id="{8F235549-BF0A-4B98-8561-3786244E808C}" type="datetimeFigureOut">
               <a:rPr lang="en-US" smtClean="0"/>
-              <a:t>6/15/2017</a:t>
+              <a:t>3/22/2018</a:t>
             </a:fld>
             <a:endParaRPr lang="en-US"/>
           </a:p>
@@ -1870,7 +1871,7 @@
           <a:p>
             <a:fld id="{8F235549-BF0A-4B98-8561-3786244E808C}" type="datetimeFigureOut">
               <a:rPr lang="en-US" smtClean="0"/>
-              <a:t>6/15/2017</a:t>
+              <a:t>3/22/2018</a:t>
             </a:fld>
             <a:endParaRPr lang="en-US"/>
           </a:p>
@@ -2018,7 +2019,7 @@
           <a:p>
             <a:fld id="{8F235549-BF0A-4B98-8561-3786244E808C}" type="datetimeFigureOut">
               <a:rPr lang="en-US" smtClean="0"/>
-              <a:t>6/15/2017</a:t>
+              <a:t>3/22/2018</a:t>
             </a:fld>
             <a:endParaRPr lang="en-US"/>
           </a:p>
@@ -2108,7 +2109,7 @@
           <a:p>
             <a:fld id="{8F235549-BF0A-4B98-8561-3786244E808C}" type="datetimeFigureOut">
               <a:rPr lang="en-US" smtClean="0"/>
-              <a:t>6/15/2017</a:t>
+              <a:t>3/22/2018</a:t>
             </a:fld>
             <a:endParaRPr lang="en-US"/>
           </a:p>
@@ -2382,7 +2383,7 @@
           <a:p>
             <a:fld id="{8F235549-BF0A-4B98-8561-3786244E808C}" type="datetimeFigureOut">
               <a:rPr lang="en-US" smtClean="0"/>
-              <a:t>6/15/2017</a:t>
+              <a:t>3/22/2018</a:t>
             </a:fld>
             <a:endParaRPr lang="en-US"/>
           </a:p>
@@ -2687,7 +2688,7 @@
           <a:p>
             <a:fld id="{8F235549-BF0A-4B98-8561-3786244E808C}" type="datetimeFigureOut">
               <a:rPr lang="en-US" smtClean="0"/>
-              <a:t>6/15/2017</a:t>
+              <a:t>3/22/2018</a:t>
             </a:fld>
             <a:endParaRPr lang="en-US"/>
           </a:p>
@@ -2985,7 +2986,7 @@
           <a:p>
             <a:fld id="{8F235549-BF0A-4B98-8561-3786244E808C}" type="datetimeFigureOut">
               <a:rPr lang="en-US" smtClean="0"/>
-              <a:t>6/15/2017</a:t>
+              <a:t>3/22/2018</a:t>
             </a:fld>
             <a:endParaRPr lang="en-US"/>
           </a:p>
@@ -3863,6 +3864,202 @@
           <a:p>
             <a:r>
               <a:rPr lang="en-US" dirty="0" smtClean="0"/>
+              <a:t>@Required Annotation</a:t>
+            </a:r>
+            <a:endParaRPr lang="en-US" dirty="0"/>
+          </a:p>
+        </p:txBody>
+      </p:sp>
+      <p:sp>
+        <p:nvSpPr>
+          <p:cNvPr id="3" name="Content Placeholder 2"/>
+          <p:cNvSpPr>
+            <a:spLocks noGrp="1"/>
+          </p:cNvSpPr>
+          <p:nvPr>
+            <p:ph idx="1"/>
+          </p:nvPr>
+        </p:nvSpPr>
+        <p:spPr/>
+        <p:txBody>
+          <a:bodyPr>
+            <a:normAutofit/>
+          </a:bodyPr>
+          <a:lstStyle/>
+          <a:p>
+            <a:pPr fontAlgn="base"/>
+            <a:r>
+              <a:rPr lang="en-GB" sz="1400" dirty="0"/>
+              <a:t>@Required</a:t>
+            </a:r>
+            <a:r>
+              <a:rPr lang="en-GB" sz="1400" dirty="0"/>
+              <a:t> </a:t>
+            </a:r>
+            <a:r>
+              <a:rPr lang="en-GB" sz="1400" dirty="0" smtClean="0"/>
+              <a:t>– can be used to set the </a:t>
+            </a:r>
+            <a:r>
+              <a:rPr lang="en-GB" sz="1400" dirty="0" smtClean="0">
+                <a:solidFill>
+                  <a:srgbClr val="FF0000"/>
+                </a:solidFill>
+              </a:rPr>
+              <a:t>mandatory dependency </a:t>
+            </a:r>
+            <a:r>
+              <a:rPr lang="en-GB" sz="1400" dirty="0"/>
+              <a:t>on setter method</a:t>
+            </a:r>
+          </a:p>
+          <a:p>
+            <a:pPr marL="274320" lvl="1" indent="0" fontAlgn="base">
+              <a:buNone/>
+            </a:pPr>
+            <a:r>
+              <a:rPr lang="en-GB" sz="1200" dirty="0"/>
+              <a:t>@Required</a:t>
+            </a:r>
+            <a:endParaRPr lang="en-GB" sz="1200" dirty="0" smtClean="0"/>
+          </a:p>
+          <a:p>
+            <a:pPr marL="274320" lvl="1" indent="0" fontAlgn="base">
+              <a:buNone/>
+            </a:pPr>
+            <a:r>
+              <a:rPr lang="en-GB" sz="1200" dirty="0" smtClean="0"/>
+              <a:t>public </a:t>
+            </a:r>
+            <a:r>
+              <a:rPr lang="en-GB" sz="1200" dirty="0"/>
+              <a:t>void</a:t>
+            </a:r>
+            <a:r>
+              <a:rPr lang="en-GB" sz="1200" dirty="0"/>
+              <a:t> </a:t>
+            </a:r>
+            <a:r>
+              <a:rPr lang="en-GB" sz="1200" dirty="0" err="1"/>
+              <a:t>setAge</a:t>
+            </a:r>
+            <a:r>
+              <a:rPr lang="en-GB" sz="1200" dirty="0"/>
+              <a:t>(Integer</a:t>
+            </a:r>
+            <a:r>
+              <a:rPr lang="en-GB" sz="1200" dirty="0"/>
+              <a:t> age</a:t>
+            </a:r>
+            <a:r>
+              <a:rPr lang="en-GB" sz="1200" dirty="0"/>
+              <a:t>)</a:t>
+            </a:r>
+            <a:r>
+              <a:rPr lang="en-GB" sz="1200" dirty="0"/>
+              <a:t> </a:t>
+            </a:r>
+            <a:r>
+              <a:rPr lang="en-GB" sz="1200" dirty="0"/>
+              <a:t>{</a:t>
+            </a:r>
+            <a:r>
+              <a:rPr lang="en-GB" sz="1200" dirty="0"/>
+              <a:t> </a:t>
+            </a:r>
+            <a:r>
+              <a:rPr lang="en-GB" sz="1200" dirty="0" err="1"/>
+              <a:t>this.</a:t>
+            </a:r>
+            <a:r>
+              <a:rPr lang="en-GB" sz="1200" dirty="0" err="1"/>
+              <a:t>age</a:t>
+            </a:r>
+            <a:r>
+              <a:rPr lang="en-GB" sz="1200" dirty="0"/>
+              <a:t> </a:t>
+            </a:r>
+            <a:r>
+              <a:rPr lang="en-GB" sz="1200" dirty="0"/>
+              <a:t>=</a:t>
+            </a:r>
+            <a:r>
+              <a:rPr lang="en-GB" sz="1200" dirty="0"/>
+              <a:t> age</a:t>
+            </a:r>
+            <a:r>
+              <a:rPr lang="en-GB" sz="1200" dirty="0"/>
+              <a:t>;</a:t>
+            </a:r>
+            <a:r>
+              <a:rPr lang="en-GB" sz="1200" dirty="0"/>
+              <a:t> </a:t>
+            </a:r>
+            <a:r>
+              <a:rPr lang="en-GB" sz="1200" dirty="0"/>
+              <a:t>}</a:t>
+            </a:r>
+            <a:endParaRPr lang="en-GB" sz="1200" dirty="0"/>
+          </a:p>
+          <a:p>
+            <a:endParaRPr lang="en-GB" sz="1400" dirty="0"/>
+          </a:p>
+        </p:txBody>
+      </p:sp>
+    </p:spTree>
+    <p:extLst>
+      <p:ext uri="{BB962C8B-B14F-4D97-AF65-F5344CB8AC3E}">
+        <p14:creationId xmlns:p14="http://schemas.microsoft.com/office/powerpoint/2010/main" val="3636673416"/>
+      </p:ext>
+    </p:extLst>
+  </p:cSld>
+  <p:clrMapOvr>
+    <a:masterClrMapping/>
+  </p:clrMapOvr>
+  <p:timing>
+    <p:tnLst>
+      <p:par>
+        <p:cTn id="1" dur="indefinite" restart="never" nodeType="tmRoot"/>
+      </p:par>
+    </p:tnLst>
+  </p:timing>
+</p:sld>
+</file>
+
+<file path=ppt/slides/slide5.xml><?xml version="1.0" encoding="utf-8"?>
+<p:sld xmlns:a="http://schemas.openxmlformats.org/drawingml/2006/main" xmlns:r="http://schemas.openxmlformats.org/officeDocument/2006/relationships" xmlns:p="http://schemas.openxmlformats.org/presentationml/2006/main">
+  <p:cSld>
+    <p:spTree>
+      <p:nvGrpSpPr>
+        <p:cNvPr id="1" name=""/>
+        <p:cNvGrpSpPr/>
+        <p:nvPr/>
+      </p:nvGrpSpPr>
+      <p:grpSpPr>
+        <a:xfrm>
+          <a:off x="0" y="0"/>
+          <a:ext cx="0" cy="0"/>
+          <a:chOff x="0" y="0"/>
+          <a:chExt cx="0" cy="0"/>
+        </a:xfrm>
+      </p:grpSpPr>
+      <p:sp>
+        <p:nvSpPr>
+          <p:cNvPr id="2" name="Title 1"/>
+          <p:cNvSpPr>
+            <a:spLocks noGrp="1"/>
+          </p:cNvSpPr>
+          <p:nvPr>
+            <p:ph type="title"/>
+          </p:nvPr>
+        </p:nvSpPr>
+        <p:spPr/>
+        <p:txBody>
+          <a:bodyPr/>
+          <a:lstStyle/>
+          <a:p>
+            <a:r>
+              <a:rPr lang="en-US" dirty="0" smtClean="0"/>
               <a:t>References</a:t>
             </a:r>
             <a:endParaRPr lang="en-US" dirty="0"/>

</xml_diff>